<commit_message>
Paar Sätze zwischen den Folien verschoben
</commit_message>
<xml_diff>
--- a/docs/Zwischenpräsentation Jan/Präsentation Bavariathek.pptx
+++ b/docs/Zwischenpräsentation Jan/Präsentation Bavariathek.pptx
@@ -856,69 +856,6 @@
               <a:t> Mai 2019</a:t>
             </a:r>
           </a:p>
-          <a:p>
-            <a:r>
-              <a:rPr lang="de-DE" dirty="0"/>
-              <a:t>: Museumskomplex baut sich zusammen aus </a:t>
-            </a:r>
-            <a:r>
-              <a:rPr lang="de-DE" dirty="0" err="1"/>
-              <a:t>HdbG</a:t>
-            </a:r>
-            <a:r>
-              <a:rPr lang="de-DE" dirty="0"/>
-              <a:t>, </a:t>
-            </a:r>
-            <a:r>
-              <a:rPr lang="de-DE" dirty="0" err="1"/>
-              <a:t>Bavariathek</a:t>
-            </a:r>
-            <a:r>
-              <a:rPr lang="de-DE" dirty="0"/>
-              <a:t> und dem </a:t>
-            </a:r>
-            <a:r>
-              <a:rPr lang="de-DE" dirty="0" err="1"/>
-              <a:t>österreischen</a:t>
-            </a:r>
-            <a:r>
-              <a:rPr lang="de-DE" dirty="0"/>
-              <a:t> Stadel( Depot) </a:t>
-            </a:r>
-          </a:p>
-          <a:p>
-            <a:r>
-              <a:rPr lang="de-DE" dirty="0"/>
-              <a:t>: </a:t>
-            </a:r>
-            <a:r>
-              <a:rPr lang="de-DE" dirty="0" err="1"/>
-              <a:t>Bavariathek</a:t>
-            </a:r>
-            <a:r>
-              <a:rPr lang="de-DE" dirty="0"/>
-              <a:t> fungiert als Bindeglied zwischen Stadel und </a:t>
-            </a:r>
-            <a:r>
-              <a:rPr lang="de-DE" dirty="0" err="1"/>
-              <a:t>HdbG</a:t>
-            </a:r>
-            <a:r>
-              <a:rPr lang="de-DE" dirty="0"/>
-              <a:t> </a:t>
-            </a:r>
-          </a:p>
-          <a:p>
-            <a:r>
-              <a:rPr lang="de-DE" dirty="0"/>
-              <a:t>: Verwaltung des gesamten Museumskomplexes in der </a:t>
-            </a:r>
-            <a:r>
-              <a:rPr lang="de-DE" dirty="0" err="1"/>
-              <a:t>Bavariathek</a:t>
-            </a:r>
-            <a:endParaRPr lang="de-DE" dirty="0"/>
-          </a:p>
         </p:txBody>
       </p:sp>
       <p:sp>
@@ -1004,7 +941,83 @@
           <a:p>
             <a:r>
               <a:rPr lang="de-DE" dirty="0"/>
-              <a:t>Luftbild mit Aufteilungen </a:t>
+              <a:t>Luftbild mit Aufteilung</a:t>
+            </a:r>
+          </a:p>
+          <a:p>
+            <a:endParaRPr lang="de-DE" dirty="0"/>
+          </a:p>
+          <a:p>
+            <a:r>
+              <a:rPr lang="de-DE" dirty="0"/>
+              <a:t>: Museumskomplex baut sich zusammen aus </a:t>
+            </a:r>
+            <a:r>
+              <a:rPr lang="de-DE" dirty="0" err="1"/>
+              <a:t>HdbG</a:t>
+            </a:r>
+            <a:r>
+              <a:rPr lang="de-DE" dirty="0"/>
+              <a:t>, </a:t>
+            </a:r>
+            <a:r>
+              <a:rPr lang="de-DE" dirty="0" err="1"/>
+              <a:t>Bavariathek</a:t>
+            </a:r>
+            <a:r>
+              <a:rPr lang="de-DE" dirty="0"/>
+              <a:t> und dem </a:t>
+            </a:r>
+            <a:r>
+              <a:rPr lang="de-DE" dirty="0" err="1"/>
+              <a:t>österreischen</a:t>
+            </a:r>
+            <a:r>
+              <a:rPr lang="de-DE" dirty="0"/>
+              <a:t> Stadel( Depot) </a:t>
+            </a:r>
+          </a:p>
+          <a:p>
+            <a:r>
+              <a:rPr lang="de-DE" dirty="0"/>
+              <a:t>: </a:t>
+            </a:r>
+            <a:r>
+              <a:rPr lang="de-DE" dirty="0" err="1"/>
+              <a:t>Bavariathek</a:t>
+            </a:r>
+            <a:r>
+              <a:rPr lang="de-DE" dirty="0"/>
+              <a:t> fungiert als Bindeglied zwischen Stadel und </a:t>
+            </a:r>
+            <a:r>
+              <a:rPr lang="de-DE" dirty="0" err="1"/>
+              <a:t>HdbG</a:t>
+            </a:r>
+            <a:r>
+              <a:rPr lang="de-DE" dirty="0"/>
+              <a:t> </a:t>
+            </a:r>
+          </a:p>
+          <a:p>
+            <a:r>
+              <a:rPr lang="de-DE" dirty="0"/>
+              <a:t>: Verwaltung des gesamten Museumskomplexes in der </a:t>
+            </a:r>
+            <a:r>
+              <a:rPr lang="de-DE" dirty="0" err="1"/>
+              <a:t>Bavariathek</a:t>
+            </a:r>
+            <a:endParaRPr lang="de-DE" dirty="0"/>
+          </a:p>
+          <a:p>
+            <a:r>
+              <a:rPr lang="de-DE" dirty="0" err="1"/>
+              <a:t>ngen</a:t>
+            </a:r>
+            <a:r>
+              <a:rPr lang="de-DE" dirty="0"/>
+              <a:t> </a:t>
             </a:r>
           </a:p>
         </p:txBody>
@@ -1276,37 +1289,7 @@
             </a:r>
             <a:r>
               <a:rPr lang="de-DE" dirty="0"/>
-              <a:t> Modellierung des Projektraums. </a:t>
-            </a:r>
-          </a:p>
-          <a:p>
-            <a:r>
-              <a:rPr lang="de-DE" dirty="0"/>
-              <a:t>Entwurf von </a:t>
-            </a:r>
-            <a:r>
-              <a:rPr lang="de-DE" dirty="0" err="1"/>
-              <a:t>Placeholder</a:t>
-            </a:r>
-            <a:r>
-              <a:rPr lang="de-DE" dirty="0"/>
-              <a:t> Assets mit welchen die </a:t>
-            </a:r>
-            <a:r>
-              <a:rPr lang="de-DE" dirty="0" err="1"/>
-              <a:t>Bavariathek</a:t>
-            </a:r>
-            <a:r>
-              <a:rPr lang="de-DE" dirty="0"/>
-              <a:t> weiterarbeiten kann; Stühle, Tische, Podium mit </a:t>
-            </a:r>
-            <a:r>
-              <a:rPr lang="de-DE" dirty="0" err="1"/>
-              <a:t>Microfon</a:t>
-            </a:r>
-            <a:r>
-              <a:rPr lang="de-DE" dirty="0"/>
-              <a:t>?, Präsentationsmaterial (ggf. Platzhalter „Kunst)</a:t>
+              <a:t> Modellierung des Projektraums. (Später mehr)</a:t>
             </a:r>
           </a:p>
           <a:p>
@@ -1444,7 +1427,15 @@
           <a:p>
             <a:r>
               <a:rPr lang="de-DE" dirty="0"/>
-              <a:t>Was ist der Projektraum? Vermutlich werden hier die Schulklassen eingeladen, oder? </a:t>
+              <a:t>Der Projektraum soll </a:t>
+            </a:r>
+            <a:r>
+              <a:rPr lang="de-DE" dirty="0" err="1"/>
+              <a:t>detailierter</a:t>
+            </a:r>
+            <a:r>
+              <a:rPr lang="de-DE" dirty="0"/>
+              <a:t> dargestellt werden als die Restlichen Räume.</a:t>
             </a:r>
           </a:p>
           <a:p>
@@ -1453,8 +1444,65 @@
           <a:p>
             <a:r>
               <a:rPr lang="de-DE" dirty="0"/>
-              <a:t>Was wird darin ausgestellt.</a:t>
-            </a:r>
+              <a:t>Hier sollen in Zukunft z.B. Projekte von Schülern vorgestellt, Plakate ausgehängt oder Präsentationen vorbereitet werden.</a:t>
+            </a:r>
+          </a:p>
+          <a:p>
+            <a:endParaRPr lang="de-DE" dirty="0"/>
+          </a:p>
+          <a:p>
+            <a:pPr marL="0" marR="0" lvl="0" indent="0" algn="l" defTabSz="914400" rtl="0" eaLnBrk="1" fontAlgn="auto" latinLnBrk="0" hangingPunct="1">
+              <a:lnSpc>
+                <a:spcPct val="100000"/>
+              </a:lnSpc>
+              <a:spcBef>
+                <a:spcPts val="0"/>
+              </a:spcBef>
+              <a:spcAft>
+                <a:spcPts val="0"/>
+              </a:spcAft>
+              <a:buClrTx/>
+              <a:buSzTx/>
+              <a:buFontTx/>
+              <a:buNone/>
+              <a:tabLst/>
+              <a:defRPr/>
+            </a:pPr>
+            <a:r>
+              <a:rPr lang="de-DE" dirty="0"/>
+              <a:t>Entwurf von </a:t>
+            </a:r>
+            <a:r>
+              <a:rPr lang="de-DE" dirty="0" err="1"/>
+              <a:t>Placeholder</a:t>
+            </a:r>
+            <a:r>
+              <a:rPr lang="de-DE" dirty="0"/>
+              <a:t> Assets mit welchen die </a:t>
+            </a:r>
+            <a:r>
+              <a:rPr lang="de-DE" dirty="0" err="1"/>
+              <a:t>Bavariathek</a:t>
+            </a:r>
+            <a:r>
+              <a:rPr lang="de-DE" dirty="0"/>
+              <a:t> weiterarbeiten kann; Stühle, Tische, Podium mit </a:t>
+            </a:r>
+            <a:r>
+              <a:rPr lang="de-DE" dirty="0" err="1"/>
+              <a:t>Microfon</a:t>
+            </a:r>
+            <a:r>
+              <a:rPr lang="de-DE" dirty="0"/>
+              <a:t>?, Präsentationsmaterial (ggf. </a:t>
+            </a:r>
+            <a:r>
+              <a:rPr lang="de-DE"/>
+              <a:t>Platzhalter „Kunst)</a:t>
+            </a:r>
+          </a:p>
+          <a:p>
+            <a:endParaRPr lang="de-DE" dirty="0"/>
           </a:p>
         </p:txBody>
       </p:sp>

</xml_diff>